<commit_message>
servicios SOAP y ejericio
</commit_message>
<xml_diff>
--- a/_29_WS_SOAP_HolaMundo/powerpoint/SOAP Web Services.pptx
+++ b/_29_WS_SOAP_HolaMundo/powerpoint/SOAP Web Services.pptx
@@ -999,7 +999,7 @@
           <a:p>
             <a:fld id="{13F086C1-9A05-4FA5-90A9-451B2FE28877}" type="datetimeFigureOut">
               <a:rPr lang="es-ES" smtClean="0"/>
-              <a:t>10/11/2022</a:t>
+              <a:t>14/11/2022</a:t>
             </a:fld>
             <a:endParaRPr lang="es-ES"/>
           </a:p>
@@ -3185,7 +3185,7 @@
           <a:p>
             <a:fld id="{087FF9DA-8A5B-4EDC-BBEC-F299F5279DCB}" type="datetime1">
               <a:rPr lang="es-ES" smtClean="0"/>
-              <a:t>10/11/2022</a:t>
+              <a:t>14/11/2022</a:t>
             </a:fld>
             <a:endParaRPr lang="es-ES"/>
           </a:p>
@@ -3350,7 +3350,7 @@
           <a:p>
             <a:fld id="{C19B2C18-75A1-487F-A89B-318B71CA9A66}" type="datetime1">
               <a:rPr lang="es-ES" smtClean="0"/>
-              <a:t>10/11/2022</a:t>
+              <a:t>14/11/2022</a:t>
             </a:fld>
             <a:endParaRPr lang="es-ES"/>
           </a:p>
@@ -3525,7 +3525,7 @@
           <a:p>
             <a:fld id="{44C1FABB-FE27-4D6B-B897-7F8D85EF80A1}" type="datetime1">
               <a:rPr lang="es-ES" smtClean="0"/>
-              <a:t>10/11/2022</a:t>
+              <a:t>14/11/2022</a:t>
             </a:fld>
             <a:endParaRPr lang="es-ES"/>
           </a:p>
@@ -3690,7 +3690,7 @@
           <a:p>
             <a:fld id="{86FBB814-7722-4347-9167-781901DD5A1C}" type="datetime1">
               <a:rPr lang="es-ES" smtClean="0"/>
-              <a:t>10/11/2022</a:t>
+              <a:t>14/11/2022</a:t>
             </a:fld>
             <a:endParaRPr lang="es-ES"/>
           </a:p>
@@ -3931,7 +3931,7 @@
           <a:p>
             <a:fld id="{2CF5421D-F938-4AA8-AB73-CF7DB966384A}" type="datetime1">
               <a:rPr lang="es-ES" smtClean="0"/>
-              <a:t>10/11/2022</a:t>
+              <a:t>14/11/2022</a:t>
             </a:fld>
             <a:endParaRPr lang="es-ES"/>
           </a:p>
@@ -4214,7 +4214,7 @@
           <a:p>
             <a:fld id="{D865FD91-AEF2-4598-8C54-C7677C4CB82B}" type="datetime1">
               <a:rPr lang="es-ES" smtClean="0"/>
-              <a:t>10/11/2022</a:t>
+              <a:t>14/11/2022</a:t>
             </a:fld>
             <a:endParaRPr lang="es-ES"/>
           </a:p>
@@ -4643,7 +4643,7 @@
           <a:p>
             <a:fld id="{A1708B5D-C3E8-4AE3-9C58-B98E2C8BC150}" type="datetime1">
               <a:rPr lang="es-ES" smtClean="0"/>
-              <a:t>10/11/2022</a:t>
+              <a:t>14/11/2022</a:t>
             </a:fld>
             <a:endParaRPr lang="es-ES"/>
           </a:p>
@@ -4756,7 +4756,7 @@
           <a:p>
             <a:fld id="{2C4D1C95-912B-461E-B9D3-A8D73D560FB0}" type="datetime1">
               <a:rPr lang="es-ES" smtClean="0"/>
-              <a:t>10/11/2022</a:t>
+              <a:t>14/11/2022</a:t>
             </a:fld>
             <a:endParaRPr lang="es-ES"/>
           </a:p>
@@ -4846,7 +4846,7 @@
           <a:p>
             <a:fld id="{B466D362-FF24-4222-9FDB-4832DB16FB68}" type="datetime1">
               <a:rPr lang="es-ES" smtClean="0"/>
-              <a:t>10/11/2022</a:t>
+              <a:t>14/11/2022</a:t>
             </a:fld>
             <a:endParaRPr lang="es-ES"/>
           </a:p>
@@ -5035,7 +5035,7 @@
           <a:p>
             <a:fld id="{99B3C3A7-F08C-40D1-9530-477D46A318D3}" type="datetime1">
               <a:rPr lang="es-ES" smtClean="0"/>
-              <a:t>10/11/2022</a:t>
+              <a:t>14/11/2022</a:t>
             </a:fld>
             <a:endParaRPr lang="es-ES"/>
           </a:p>
@@ -5353,7 +5353,7 @@
           <a:p>
             <a:fld id="{D92C9648-95DD-4499-922D-553B764BFABD}" type="datetime1">
               <a:rPr lang="es-ES" smtClean="0"/>
-              <a:t>10/11/2022</a:t>
+              <a:t>14/11/2022</a:t>
             </a:fld>
             <a:endParaRPr lang="es-ES"/>
           </a:p>
@@ -5732,7 +5732,7 @@
           <a:p>
             <a:fld id="{CCBE6D82-2854-47B1-8D6A-B17B37645C41}" type="datetime1">
               <a:rPr lang="es-ES" smtClean="0"/>
-              <a:t>10/11/2022</a:t>
+              <a:t>14/11/2022</a:t>
             </a:fld>
             <a:endParaRPr lang="es-ES"/>
           </a:p>
@@ -12992,7 +12992,7 @@
         </p:nvSpPr>
         <p:spPr>
           <a:xfrm>
-            <a:off x="683568" y="2967335"/>
+            <a:off x="666800" y="2980455"/>
             <a:ext cx="7200800" cy="461665"/>
           </a:xfrm>
           <a:prstGeom prst="rect">
@@ -13999,7 +13999,7 @@
             <a:pPr lvl="1"/>
             <a:r>
               <a:rPr lang="es-ES" dirty="0"/>
-              <a:t>Método de clase</a:t>
+              <a:t>Anotación de clase (debajo de @Webservice)</a:t>
             </a:r>
           </a:p>
           <a:p>
@@ -14559,10 +14559,17 @@
           <a:lstStyle/>
           <a:p>
             <a:r>
-              <a:rPr lang="es-ES"/>
-              <a:t>Desde un Servicio Web, se puede acceder a un Contexto del Servicio, que es recibido como recurso en el bean que implementa el servicio.</a:t>
-            </a:r>
-            <a:endParaRPr lang="es-ES" dirty="0"/>
+              <a:rPr lang="es-ES" dirty="0"/>
+              <a:t>Desde un Servicio Web, se puede acceder a un Contexto del Servicio, que es recibido como recurso en el </a:t>
+            </a:r>
+            <a:r>
+              <a:rPr lang="es-ES" dirty="0" err="1"/>
+              <a:t>bean</a:t>
+            </a:r>
+            <a:r>
+              <a:rPr lang="es-ES" dirty="0"/>
+              <a:t> que implementa el servicio.</a:t>
+            </a:r>
           </a:p>
         </p:txBody>
       </p:sp>

</xml_diff>